<commit_message>
add backend in pre.pptx
</commit_message>
<xml_diff>
--- a/pre.pptx
+++ b/pre.pptx
@@ -1,6 +1,6 @@
 
 <file path=ppt/presentation.xml><?xml version="1.0" encoding="utf-8"?>
-<p:presentation xmlns:a="http://schemas.openxmlformats.org/drawingml/2006/main" xmlns:r="http://schemas.openxmlformats.org/officeDocument/2006/relationships" xmlns:p="http://schemas.openxmlformats.org/presentationml/2006/main" autoCompressPictures="0">
+<p:presentation xmlns:a="http://schemas.openxmlformats.org/drawingml/2006/main" xmlns:r="http://schemas.openxmlformats.org/officeDocument/2006/relationships" xmlns:p="http://schemas.openxmlformats.org/presentationml/2006/main" saveSubsetFonts="1" autoCompressPictures="0">
   <p:sldMasterIdLst>
     <p:sldMasterId id="2147483648" r:id="rId1"/>
   </p:sldMasterIdLst>
@@ -11,6 +11,8 @@
     <p:sldId id="259" r:id="rId5"/>
     <p:sldId id="260" r:id="rId6"/>
     <p:sldId id="261" r:id="rId7"/>
+    <p:sldId id="262" r:id="rId8"/>
+    <p:sldId id="263" r:id="rId9"/>
   </p:sldIdLst>
   <p:sldSz cx="12192000" cy="6858000"/>
   <p:notesSz cx="6858000" cy="9144000"/>
@@ -109,6 +111,11 @@
       </a:defRPr>
     </a:lvl9pPr>
   </p:defaultTextStyle>
+  <p:extLst>
+    <p:ext uri="{EFAFB233-063F-42B5-8137-9DF3F51BA10A}">
+      <p15:sldGuideLst xmlns:p15="http://schemas.microsoft.com/office/powerpoint/2012/main"/>
+    </p:ext>
+  </p:extLst>
 </p:presentation>
 </file>
 
@@ -301,7 +308,7 @@
             <a:fld id="{B61BEF0D-F0BB-DE4B-95CE-6DB70DBA9567}" type="datetimeFigureOut">
               <a:rPr lang="en-US" dirty="0"/>
               <a:pPr/>
-              <a:t>7/27/2017</a:t>
+              <a:t>7/27/17</a:t>
             </a:fld>
             <a:endParaRPr lang="en-US" dirty="0"/>
           </a:p>
@@ -636,7 +643,7 @@
             <a:fld id="{B61BEF0D-F0BB-DE4B-95CE-6DB70DBA9567}" type="datetimeFigureOut">
               <a:rPr lang="en-US" dirty="0"/>
               <a:pPr/>
-              <a:t>7/27/2017</a:t>
+              <a:t>7/27/17</a:t>
             </a:fld>
             <a:endParaRPr lang="en-US" dirty="0"/>
           </a:p>
@@ -1034,7 +1041,7 @@
             <a:fld id="{B61BEF0D-F0BB-DE4B-95CE-6DB70DBA9567}" type="datetimeFigureOut">
               <a:rPr lang="en-US" dirty="0"/>
               <a:pPr/>
-              <a:t>7/27/2017</a:t>
+              <a:t>7/27/17</a:t>
             </a:fld>
             <a:endParaRPr lang="en-US" dirty="0"/>
           </a:p>
@@ -1367,7 +1374,7 @@
             <a:fld id="{B61BEF0D-F0BB-DE4B-95CE-6DB70DBA9567}" type="datetimeFigureOut">
               <a:rPr lang="en-US" dirty="0"/>
               <a:pPr/>
-              <a:t>7/27/2017</a:t>
+              <a:t>7/27/17</a:t>
             </a:fld>
             <a:endParaRPr lang="en-US" dirty="0"/>
           </a:p>
@@ -1684,7 +1691,7 @@
             <a:fld id="{B61BEF0D-F0BB-DE4B-95CE-6DB70DBA9567}" type="datetimeFigureOut">
               <a:rPr lang="en-US" dirty="0"/>
               <a:pPr/>
-              <a:t>7/27/2017</a:t>
+              <a:t>7/27/17</a:t>
             </a:fld>
             <a:endParaRPr lang="en-US" dirty="0"/>
           </a:p>
@@ -2077,7 +2084,7 @@
             <a:fld id="{B61BEF0D-F0BB-DE4B-95CE-6DB70DBA9567}" type="datetimeFigureOut">
               <a:rPr lang="en-US" dirty="0"/>
               <a:pPr/>
-              <a:t>7/27/2017</a:t>
+              <a:t>7/27/17</a:t>
             </a:fld>
             <a:endParaRPr lang="en-US" dirty="0"/>
           </a:p>
@@ -2331,7 +2338,7 @@
             <a:fld id="{B61BEF0D-F0BB-DE4B-95CE-6DB70DBA9567}" type="datetimeFigureOut">
               <a:rPr lang="en-US" dirty="0"/>
               <a:pPr/>
-              <a:t>7/27/2017</a:t>
+              <a:t>7/27/17</a:t>
             </a:fld>
             <a:endParaRPr lang="en-US" dirty="0"/>
           </a:p>
@@ -2590,7 +2597,7 @@
             <a:fld id="{B61BEF0D-F0BB-DE4B-95CE-6DB70DBA9567}" type="datetimeFigureOut">
               <a:rPr lang="en-US" dirty="0"/>
               <a:pPr/>
-              <a:t>7/27/2017</a:t>
+              <a:t>7/27/17</a:t>
             </a:fld>
             <a:endParaRPr lang="en-US" dirty="0"/>
           </a:p>
@@ -2849,7 +2856,7 @@
             <a:fld id="{B61BEF0D-F0BB-DE4B-95CE-6DB70DBA9567}" type="datetimeFigureOut">
               <a:rPr lang="en-US" dirty="0"/>
               <a:pPr/>
-              <a:t>7/27/2017</a:t>
+              <a:t>7/27/17</a:t>
             </a:fld>
             <a:endParaRPr lang="en-US" dirty="0"/>
           </a:p>
@@ -3175,7 +3182,7 @@
             <a:fld id="{B61BEF0D-F0BB-DE4B-95CE-6DB70DBA9567}" type="datetimeFigureOut">
               <a:rPr lang="en-US" dirty="0"/>
               <a:pPr/>
-              <a:t>7/27/2017</a:t>
+              <a:t>7/27/17</a:t>
             </a:fld>
             <a:endParaRPr lang="en-US" dirty="0"/>
           </a:p>
@@ -3495,7 +3502,7 @@
             <a:fld id="{B61BEF0D-F0BB-DE4B-95CE-6DB70DBA9567}" type="datetimeFigureOut">
               <a:rPr lang="en-US" dirty="0"/>
               <a:pPr/>
-              <a:t>7/27/2017</a:t>
+              <a:t>7/27/17</a:t>
             </a:fld>
             <a:endParaRPr lang="en-US" dirty="0"/>
           </a:p>
@@ -3949,7 +3956,7 @@
             <a:fld id="{B61BEF0D-F0BB-DE4B-95CE-6DB70DBA9567}" type="datetimeFigureOut">
               <a:rPr lang="en-US" dirty="0"/>
               <a:pPr/>
-              <a:t>7/27/2017</a:t>
+              <a:t>7/27/17</a:t>
             </a:fld>
             <a:endParaRPr lang="en-US" dirty="0"/>
           </a:p>
@@ -4151,7 +4158,7 @@
             <a:fld id="{B61BEF0D-F0BB-DE4B-95CE-6DB70DBA9567}" type="datetimeFigureOut">
               <a:rPr lang="en-US" dirty="0"/>
               <a:pPr/>
-              <a:t>7/27/2017</a:t>
+              <a:t>7/27/17</a:t>
             </a:fld>
             <a:endParaRPr lang="en-US" dirty="0"/>
           </a:p>
@@ -4325,7 +4332,7 @@
             <a:fld id="{B61BEF0D-F0BB-DE4B-95CE-6DB70DBA9567}" type="datetimeFigureOut">
               <a:rPr lang="en-US" dirty="0"/>
               <a:pPr/>
-              <a:t>7/27/2017</a:t>
+              <a:t>7/27/17</a:t>
             </a:fld>
             <a:endParaRPr lang="en-US" dirty="0"/>
           </a:p>
@@ -4655,7 +4662,7 @@
             <a:fld id="{B61BEF0D-F0BB-DE4B-95CE-6DB70DBA9567}" type="datetimeFigureOut">
               <a:rPr lang="en-US" dirty="0"/>
               <a:pPr/>
-              <a:t>7/27/2017</a:t>
+              <a:t>7/27/17</a:t>
             </a:fld>
             <a:endParaRPr lang="en-US" dirty="0"/>
           </a:p>
@@ -4997,7 +5004,7 @@
             <a:fld id="{B61BEF0D-F0BB-DE4B-95CE-6DB70DBA9567}" type="datetimeFigureOut">
               <a:rPr lang="en-US" dirty="0"/>
               <a:pPr/>
-              <a:t>7/27/2017</a:t>
+              <a:t>7/27/17</a:t>
             </a:fld>
             <a:endParaRPr lang="en-US" dirty="0"/>
           </a:p>
@@ -7111,7 +7118,7 @@
             <a:fld id="{B61BEF0D-F0BB-DE4B-95CE-6DB70DBA9567}" type="datetimeFigureOut">
               <a:rPr lang="en-US" dirty="0"/>
               <a:pPr/>
-              <a:t>7/27/2017</a:t>
+              <a:t>7/27/17</a:t>
             </a:fld>
             <a:endParaRPr lang="en-US" dirty="0"/>
           </a:p>
@@ -8257,7 +8264,104 @@
           <a:bodyPr/>
           <a:lstStyle/>
           <a:p>
-            <a:endParaRPr lang="zh-CN" altLang="en-US"/>
+            <a:r>
+              <a:rPr lang="zh-CN" altLang="en-US" dirty="0" smtClean="0"/>
+              <a:t>采用了</a:t>
+            </a:r>
+            <a:r>
+              <a:rPr lang="en-US" altLang="zh-CN" dirty="0" smtClean="0"/>
+              <a:t>Django </a:t>
+            </a:r>
+            <a:r>
+              <a:rPr lang="en-US" altLang="zh-CN" dirty="0"/>
+              <a:t>REST </a:t>
+            </a:r>
+            <a:r>
+              <a:rPr lang="en-US" altLang="zh-CN" dirty="0" smtClean="0"/>
+              <a:t>framework</a:t>
+            </a:r>
+            <a:r>
+              <a:rPr lang="zh-CN" altLang="en-US" dirty="0" smtClean="0"/>
+              <a:t>作为网站后台的框架</a:t>
+            </a:r>
+            <a:endParaRPr lang="en-US" altLang="zh-CN" dirty="0" smtClean="0"/>
+          </a:p>
+          <a:p>
+            <a:pPr lvl="1"/>
+            <a:r>
+              <a:rPr lang="zh-CN" altLang="en-US" dirty="0" smtClean="0"/>
+              <a:t>提供</a:t>
+            </a:r>
+            <a:r>
+              <a:rPr lang="en-US" altLang="zh-CN" dirty="0" smtClean="0"/>
+              <a:t>RESTful</a:t>
+            </a:r>
+            <a:r>
+              <a:rPr lang="zh-CN" altLang="en-US" dirty="0" smtClean="0"/>
+              <a:t>形式的</a:t>
+            </a:r>
+            <a:r>
+              <a:rPr lang="en-US" altLang="zh-CN" dirty="0" smtClean="0"/>
+              <a:t>API</a:t>
+            </a:r>
+          </a:p>
+          <a:p>
+            <a:pPr lvl="1"/>
+            <a:r>
+              <a:rPr lang="zh-CN" altLang="en-US" dirty="0" smtClean="0"/>
+              <a:t>方便的权限管理</a:t>
+            </a:r>
+            <a:endParaRPr lang="en-US" altLang="zh-CN" dirty="0" smtClean="0"/>
+          </a:p>
+          <a:p>
+            <a:r>
+              <a:rPr lang="en-US" altLang="zh-CN" dirty="0" err="1" smtClean="0"/>
+              <a:t>Apache+https</a:t>
+            </a:r>
+            <a:r>
+              <a:rPr lang="zh-CN" altLang="en-US" dirty="0" smtClean="0"/>
+              <a:t>的配置</a:t>
+            </a:r>
+            <a:endParaRPr lang="en-US" altLang="zh-CN" dirty="0" smtClean="0"/>
+          </a:p>
+          <a:p>
+            <a:pPr lvl="1"/>
+            <a:r>
+              <a:rPr lang="zh-CN" altLang="en-US" dirty="0" smtClean="0"/>
+              <a:t>传输层面更加安全</a:t>
+            </a:r>
+            <a:endParaRPr lang="en-US" altLang="zh-CN" dirty="0" smtClean="0"/>
+          </a:p>
+          <a:p>
+            <a:pPr lvl="1"/>
+            <a:r>
+              <a:rPr lang="zh-CN" altLang="en-US" dirty="0" smtClean="0"/>
+              <a:t>并发性更好</a:t>
+            </a:r>
+            <a:endParaRPr lang="en-US" altLang="zh-CN" dirty="0" smtClean="0"/>
+          </a:p>
+          <a:p>
+            <a:r>
+              <a:rPr lang="zh-CN" altLang="en-US" dirty="0" smtClean="0"/>
+              <a:t>采用</a:t>
+            </a:r>
+            <a:r>
+              <a:rPr lang="en-US" altLang="zh-CN" dirty="0" smtClean="0"/>
+              <a:t>token</a:t>
+            </a:r>
+            <a:r>
+              <a:rPr lang="zh-CN" altLang="en-US" dirty="0" smtClean="0"/>
+              <a:t>的验证方式</a:t>
+            </a:r>
+            <a:endParaRPr lang="en-US" altLang="zh-CN" dirty="0" smtClean="0"/>
+          </a:p>
+          <a:p>
+            <a:pPr lvl="1"/>
+            <a:r>
+              <a:rPr lang="zh-CN" altLang="en-US" dirty="0" smtClean="0"/>
+              <a:t>避免了直接使用密码明文</a:t>
+            </a:r>
+            <a:endParaRPr lang="zh-CN" altLang="en-US" dirty="0"/>
           </a:p>
         </p:txBody>
       </p:sp>
@@ -8265,6 +8369,420 @@
     <p:extLst>
       <p:ext uri="{BB962C8B-B14F-4D97-AF65-F5344CB8AC3E}">
         <p14:creationId xmlns:p14="http://schemas.microsoft.com/office/powerpoint/2010/main" val="3299760390"/>
+      </p:ext>
+    </p:extLst>
+  </p:cSld>
+  <p:clrMapOvr>
+    <a:masterClrMapping/>
+  </p:clrMapOvr>
+</p:sld>
+</file>
+
+<file path=ppt/slides/slide7.xml><?xml version="1.0" encoding="utf-8"?>
+<p:sld xmlns:a="http://schemas.openxmlformats.org/drawingml/2006/main" xmlns:r="http://schemas.openxmlformats.org/officeDocument/2006/relationships" xmlns:p="http://schemas.openxmlformats.org/presentationml/2006/main">
+  <p:cSld>
+    <p:spTree>
+      <p:nvGrpSpPr>
+        <p:cNvPr id="1" name=""/>
+        <p:cNvGrpSpPr/>
+        <p:nvPr/>
+      </p:nvGrpSpPr>
+      <p:grpSpPr>
+        <a:xfrm>
+          <a:off x="0" y="0"/>
+          <a:ext cx="0" cy="0"/>
+          <a:chOff x="0" y="0"/>
+          <a:chExt cx="0" cy="0"/>
+        </a:xfrm>
+      </p:grpSpPr>
+      <p:sp>
+        <p:nvSpPr>
+          <p:cNvPr id="2" name="标题 1"/>
+          <p:cNvSpPr>
+            <a:spLocks noGrp="1"/>
+          </p:cNvSpPr>
+          <p:nvPr>
+            <p:ph type="title"/>
+          </p:nvPr>
+        </p:nvSpPr>
+        <p:spPr/>
+        <p:txBody>
+          <a:bodyPr/>
+          <a:lstStyle/>
+          <a:p>
+            <a:r>
+              <a:rPr kumimoji="1" lang="zh-CN" altLang="en-US" dirty="0" smtClean="0"/>
+              <a:t>终端用户分类</a:t>
+            </a:r>
+            <a:endParaRPr kumimoji="1" lang="zh-CN" altLang="en-US" dirty="0"/>
+          </a:p>
+        </p:txBody>
+      </p:sp>
+      <p:sp>
+        <p:nvSpPr>
+          <p:cNvPr id="3" name="内容占位符 2"/>
+          <p:cNvSpPr>
+            <a:spLocks noGrp="1"/>
+          </p:cNvSpPr>
+          <p:nvPr>
+            <p:ph idx="1"/>
+          </p:nvPr>
+        </p:nvSpPr>
+        <p:spPr>
+          <a:xfrm>
+            <a:off x="2589212" y="1490597"/>
+            <a:ext cx="8915400" cy="5248405"/>
+          </a:xfrm>
+        </p:spPr>
+        <p:txBody>
+          <a:bodyPr>
+            <a:normAutofit fontScale="92500" lnSpcReduction="10000"/>
+          </a:bodyPr>
+          <a:lstStyle/>
+          <a:p>
+            <a:r>
+              <a:rPr kumimoji="1" lang="en-US" altLang="zh-CN" dirty="0" smtClean="0"/>
+              <a:t>Register</a:t>
+            </a:r>
+          </a:p>
+          <a:p>
+            <a:pPr lvl="1"/>
+            <a:r>
+              <a:rPr kumimoji="1" lang="zh-CN" altLang="en-US" dirty="0" smtClean="0"/>
+              <a:t>场景：注册中心的终端</a:t>
+            </a:r>
+            <a:endParaRPr kumimoji="1" lang="en-US" altLang="zh-CN" dirty="0" smtClean="0"/>
+          </a:p>
+          <a:p>
+            <a:pPr lvl="1"/>
+            <a:r>
+              <a:rPr lang="zh-CN" altLang="en-US" dirty="0" smtClean="0"/>
+              <a:t>权限：为</a:t>
+            </a:r>
+            <a:r>
+              <a:rPr lang="zh-CN" altLang="en-US" dirty="0"/>
+              <a:t>一个学生注册新卡、更新卡的有效期和获取学生的基本信息</a:t>
+            </a:r>
+            <a:r>
+              <a:rPr lang="zh-CN" altLang="en-US" dirty="0" smtClean="0"/>
+              <a:t>等</a:t>
+            </a:r>
+            <a:endParaRPr lang="en-US" altLang="zh-CN" dirty="0" smtClean="0"/>
+          </a:p>
+          <a:p>
+            <a:r>
+              <a:rPr kumimoji="1" lang="en-US" altLang="zh-CN" dirty="0" err="1" smtClean="0"/>
+              <a:t>Pos</a:t>
+            </a:r>
+            <a:endParaRPr kumimoji="1" lang="en-US" altLang="zh-CN" dirty="0" smtClean="0"/>
+          </a:p>
+          <a:p>
+            <a:pPr lvl="1"/>
+            <a:r>
+              <a:rPr kumimoji="1" lang="zh-CN" altLang="en-US" dirty="0" smtClean="0"/>
+              <a:t>场景：云闪付消费场所，如食堂和超市等</a:t>
+            </a:r>
+            <a:endParaRPr kumimoji="1" lang="en-US" altLang="zh-CN" dirty="0" smtClean="0"/>
+          </a:p>
+          <a:p>
+            <a:pPr lvl="1"/>
+            <a:r>
+              <a:rPr kumimoji="1" lang="zh-CN" altLang="en-US" dirty="0" smtClean="0"/>
+              <a:t>权限：</a:t>
+            </a:r>
+            <a:r>
+              <a:rPr lang="zh-CN" altLang="en-US" dirty="0" smtClean="0"/>
+              <a:t>减少</a:t>
+            </a:r>
+            <a:r>
+              <a:rPr lang="zh-CN" altLang="en-US" dirty="0"/>
+              <a:t>卡的</a:t>
+            </a:r>
+            <a:r>
+              <a:rPr lang="zh-CN" altLang="en-US" dirty="0" smtClean="0"/>
+              <a:t>金额</a:t>
+            </a:r>
+            <a:endParaRPr lang="en-US" altLang="zh-CN" dirty="0" smtClean="0"/>
+          </a:p>
+          <a:p>
+            <a:r>
+              <a:rPr kumimoji="1" lang="en-US" altLang="zh-CN" dirty="0" smtClean="0"/>
+              <a:t>ATM</a:t>
+            </a:r>
+          </a:p>
+          <a:p>
+            <a:pPr lvl="1"/>
+            <a:r>
+              <a:rPr kumimoji="1" lang="zh-CN" altLang="en-US" dirty="0" smtClean="0"/>
+              <a:t>场景：圈存机等机器</a:t>
+            </a:r>
+            <a:endParaRPr kumimoji="1" lang="en-US" altLang="zh-CN" dirty="0" smtClean="0"/>
+          </a:p>
+          <a:p>
+            <a:pPr lvl="1"/>
+            <a:r>
+              <a:rPr kumimoji="1" lang="zh-CN" altLang="en-US" dirty="0" smtClean="0"/>
+              <a:t>权限：增加和减少卡上的金额</a:t>
+            </a:r>
+            <a:endParaRPr kumimoji="1" lang="en-US" altLang="zh-CN" dirty="0" smtClean="0"/>
+          </a:p>
+          <a:p>
+            <a:r>
+              <a:rPr kumimoji="1" lang="en-US" altLang="zh-CN" dirty="0" smtClean="0"/>
+              <a:t>Access</a:t>
+            </a:r>
+          </a:p>
+          <a:p>
+            <a:pPr lvl="1"/>
+            <a:r>
+              <a:rPr kumimoji="1" lang="zh-CN" altLang="en-US" dirty="0" smtClean="0"/>
+              <a:t>场景：宿舍楼下的门禁终端</a:t>
+            </a:r>
+            <a:endParaRPr kumimoji="1" lang="en-US" altLang="zh-CN" dirty="0" smtClean="0"/>
+          </a:p>
+          <a:p>
+            <a:pPr lvl="1"/>
+            <a:r>
+              <a:rPr kumimoji="1" lang="zh-CN" altLang="en-US" dirty="0" smtClean="0"/>
+              <a:t>权限：</a:t>
+            </a:r>
+            <a:r>
+              <a:rPr lang="zh-CN" altLang="en-US" dirty="0"/>
+              <a:t>判断一张卡是否有通过的</a:t>
+            </a:r>
+            <a:r>
+              <a:rPr lang="zh-CN" altLang="en-US" dirty="0" smtClean="0"/>
+              <a:t>权限</a:t>
+            </a:r>
+            <a:endParaRPr lang="en-US" altLang="zh-CN" dirty="0" smtClean="0"/>
+          </a:p>
+          <a:p>
+            <a:r>
+              <a:rPr kumimoji="1" lang="en-US" altLang="zh-CN" dirty="0" smtClean="0"/>
+              <a:t>Root</a:t>
+            </a:r>
+          </a:p>
+          <a:p>
+            <a:pPr lvl="1"/>
+            <a:r>
+              <a:rPr kumimoji="1" lang="zh-CN" altLang="en-US" dirty="0" smtClean="0"/>
+              <a:t>场景：后台管理员</a:t>
+            </a:r>
+            <a:endParaRPr kumimoji="1" lang="en-US" altLang="zh-CN" dirty="0" smtClean="0"/>
+          </a:p>
+          <a:p>
+            <a:pPr lvl="1"/>
+            <a:r>
+              <a:rPr kumimoji="1" lang="zh-CN" altLang="en-US" dirty="0" smtClean="0"/>
+              <a:t>权限：以上所有权限，此外可以查看终端的操作日志</a:t>
+            </a:r>
+            <a:endParaRPr kumimoji="1" lang="en-US" altLang="zh-CN" dirty="0" smtClean="0"/>
+          </a:p>
+          <a:p>
+            <a:pPr lvl="1"/>
+            <a:endParaRPr kumimoji="1" lang="zh-CN" altLang="en-US" dirty="0"/>
+          </a:p>
+        </p:txBody>
+      </p:sp>
+    </p:spTree>
+    <p:extLst>
+      <p:ext uri="{BB962C8B-B14F-4D97-AF65-F5344CB8AC3E}">
+        <p14:creationId xmlns:p14="http://schemas.microsoft.com/office/powerpoint/2010/main" val="303073681"/>
+      </p:ext>
+    </p:extLst>
+  </p:cSld>
+  <p:clrMapOvr>
+    <a:masterClrMapping/>
+  </p:clrMapOvr>
+</p:sld>
+</file>
+
+<file path=ppt/slides/slide8.xml><?xml version="1.0" encoding="utf-8"?>
+<p:sld xmlns:a="http://schemas.openxmlformats.org/drawingml/2006/main" xmlns:r="http://schemas.openxmlformats.org/officeDocument/2006/relationships" xmlns:p="http://schemas.openxmlformats.org/presentationml/2006/main">
+  <p:cSld>
+    <p:spTree>
+      <p:nvGrpSpPr>
+        <p:cNvPr id="1" name=""/>
+        <p:cNvGrpSpPr/>
+        <p:nvPr/>
+      </p:nvGrpSpPr>
+      <p:grpSpPr>
+        <a:xfrm>
+          <a:off x="0" y="0"/>
+          <a:ext cx="0" cy="0"/>
+          <a:chOff x="0" y="0"/>
+          <a:chExt cx="0" cy="0"/>
+        </a:xfrm>
+      </p:grpSpPr>
+      <p:sp>
+        <p:nvSpPr>
+          <p:cNvPr id="2" name="标题 1"/>
+          <p:cNvSpPr>
+            <a:spLocks noGrp="1"/>
+          </p:cNvSpPr>
+          <p:nvPr>
+            <p:ph type="title"/>
+          </p:nvPr>
+        </p:nvSpPr>
+        <p:spPr/>
+        <p:txBody>
+          <a:bodyPr/>
+          <a:lstStyle/>
+          <a:p>
+            <a:r>
+              <a:rPr kumimoji="1" lang="zh-CN" altLang="en-US" dirty="0" smtClean="0"/>
+              <a:t>安全性分析</a:t>
+            </a:r>
+            <a:endParaRPr kumimoji="1" lang="zh-CN" altLang="en-US" dirty="0"/>
+          </a:p>
+        </p:txBody>
+      </p:sp>
+      <p:sp>
+        <p:nvSpPr>
+          <p:cNvPr id="3" name="内容占位符 2"/>
+          <p:cNvSpPr>
+            <a:spLocks noGrp="1"/>
+          </p:cNvSpPr>
+          <p:nvPr>
+            <p:ph idx="1"/>
+          </p:nvPr>
+        </p:nvSpPr>
+        <p:spPr/>
+        <p:txBody>
+          <a:bodyPr/>
+          <a:lstStyle/>
+          <a:p>
+            <a:r>
+              <a:rPr kumimoji="1" lang="en-US" altLang="zh-CN" dirty="0" smtClean="0"/>
+              <a:t>Django</a:t>
+            </a:r>
+            <a:r>
+              <a:rPr kumimoji="1" lang="zh-CN" altLang="en-US" dirty="0" smtClean="0"/>
+              <a:t> </a:t>
+            </a:r>
+            <a:r>
+              <a:rPr kumimoji="1" lang="en-US" altLang="zh-CN" dirty="0" smtClean="0"/>
+              <a:t>+</a:t>
+            </a:r>
+            <a:r>
+              <a:rPr kumimoji="1" lang="zh-CN" altLang="en-US" dirty="0" smtClean="0"/>
+              <a:t> </a:t>
+            </a:r>
+            <a:r>
+              <a:rPr kumimoji="1" lang="en-US" altLang="zh-CN" dirty="0" smtClean="0"/>
+              <a:t>Django</a:t>
+            </a:r>
+            <a:r>
+              <a:rPr kumimoji="1" lang="zh-CN" altLang="en-US" dirty="0" smtClean="0"/>
+              <a:t> </a:t>
+            </a:r>
+            <a:r>
+              <a:rPr kumimoji="1" lang="en-US" altLang="zh-CN" dirty="0" smtClean="0"/>
+              <a:t>REST</a:t>
+            </a:r>
+            <a:r>
+              <a:rPr kumimoji="1" lang="zh-CN" altLang="en-US" dirty="0" smtClean="0"/>
+              <a:t> </a:t>
+            </a:r>
+            <a:r>
+              <a:rPr kumimoji="1" lang="en-US" altLang="zh-CN" dirty="0" smtClean="0"/>
+              <a:t>framework</a:t>
+            </a:r>
+            <a:r>
+              <a:rPr kumimoji="1" lang="zh-CN" altLang="en-US" dirty="0" smtClean="0"/>
+              <a:t>框架</a:t>
+            </a:r>
+            <a:endParaRPr kumimoji="1" lang="en-US" altLang="zh-CN" dirty="0" smtClean="0"/>
+          </a:p>
+          <a:p>
+            <a:pPr lvl="1"/>
+            <a:r>
+              <a:rPr kumimoji="1" lang="zh-CN" altLang="en-US" dirty="0" smtClean="0"/>
+              <a:t>比较成熟的框架，最大程度的保证了安全性，避免了一些常见的漏洞</a:t>
+            </a:r>
+            <a:endParaRPr kumimoji="1" lang="en-US" altLang="zh-CN" dirty="0" smtClean="0"/>
+          </a:p>
+          <a:p>
+            <a:r>
+              <a:rPr kumimoji="1" lang="en-US" altLang="zh-CN" dirty="0" smtClean="0"/>
+              <a:t>https</a:t>
+            </a:r>
+          </a:p>
+          <a:p>
+            <a:pPr lvl="1"/>
+            <a:r>
+              <a:rPr kumimoji="1" lang="zh-CN" altLang="en-US" dirty="0" smtClean="0"/>
+              <a:t>在传输层面用</a:t>
+            </a:r>
+            <a:r>
+              <a:rPr kumimoji="1" lang="en-US" altLang="zh-CN" dirty="0" smtClean="0"/>
+              <a:t>https</a:t>
+            </a:r>
+            <a:r>
+              <a:rPr kumimoji="1" lang="zh-CN" altLang="en-US" dirty="0" smtClean="0"/>
+              <a:t>进行加密传输，避免了信息被窃取的可能</a:t>
+            </a:r>
+            <a:endParaRPr kumimoji="1" lang="en-US" altLang="zh-CN" dirty="0"/>
+          </a:p>
+          <a:p>
+            <a:r>
+              <a:rPr kumimoji="1" lang="en-US" altLang="zh-CN" dirty="0" smtClean="0"/>
+              <a:t>token</a:t>
+            </a:r>
+            <a:r>
+              <a:rPr kumimoji="1" lang="zh-CN" altLang="en-US" dirty="0" smtClean="0"/>
+              <a:t> </a:t>
+            </a:r>
+            <a:r>
+              <a:rPr kumimoji="1" lang="en-US" altLang="zh-CN" dirty="0" smtClean="0"/>
+              <a:t>+</a:t>
+            </a:r>
+            <a:r>
+              <a:rPr kumimoji="1" lang="zh-CN" altLang="en-US" dirty="0" smtClean="0"/>
+              <a:t> </a:t>
+            </a:r>
+            <a:r>
+              <a:rPr kumimoji="1" lang="en-US" altLang="zh-CN" dirty="0" smtClean="0"/>
+              <a:t>session</a:t>
+            </a:r>
+            <a:r>
+              <a:rPr kumimoji="1" lang="zh-CN" altLang="en-US" dirty="0" smtClean="0"/>
+              <a:t>多种认证机制</a:t>
+            </a:r>
+            <a:endParaRPr kumimoji="1" lang="en-US" altLang="zh-CN" dirty="0" smtClean="0"/>
+          </a:p>
+          <a:p>
+            <a:pPr lvl="1"/>
+            <a:r>
+              <a:rPr kumimoji="1" lang="zh-CN" altLang="en-US" dirty="0" smtClean="0"/>
+              <a:t>减少明文密码泄露的风险</a:t>
+            </a:r>
+            <a:endParaRPr kumimoji="1" lang="en-US" altLang="zh-CN" dirty="0" smtClean="0"/>
+          </a:p>
+          <a:p>
+            <a:r>
+              <a:rPr kumimoji="1" lang="zh-CN" altLang="en-US" dirty="0" smtClean="0"/>
+              <a:t>终端操作日志</a:t>
+            </a:r>
+            <a:r>
+              <a:rPr kumimoji="1" lang="en-US" altLang="zh-CN" dirty="0" smtClean="0"/>
+              <a:t>log</a:t>
+            </a:r>
+          </a:p>
+          <a:p>
+            <a:pPr lvl="1"/>
+            <a:r>
+              <a:rPr kumimoji="1" lang="zh-CN" altLang="en-US" dirty="0" smtClean="0"/>
+              <a:t>记录所有终端的操作，及时检测高危不正常的操作，能够尽快发现危险</a:t>
+            </a:r>
+            <a:endParaRPr kumimoji="1" lang="en-US" altLang="zh-CN" dirty="0" smtClean="0"/>
+          </a:p>
+        </p:txBody>
+      </p:sp>
+    </p:spTree>
+    <p:extLst>
+      <p:ext uri="{BB962C8B-B14F-4D97-AF65-F5344CB8AC3E}">
+        <p14:creationId xmlns:p14="http://schemas.microsoft.com/office/powerpoint/2010/main" val="530399183"/>
       </p:ext>
     </p:extLst>
   </p:cSld>

</xml_diff>